<commit_message>
imgaussfilt changed to fspecial & conv2
</commit_message>
<xml_diff>
--- a/DIP – Final Project.pptx
+++ b/DIP – Final Project.pptx
@@ -5,15 +5,18 @@
     <p:sldMasterId id="2147483660" r:id="rId1"/>
   </p:sldMasterIdLst>
   <p:notesMasterIdLst>
-    <p:notesMasterId r:id="rId8"/>
+    <p:notesMasterId r:id="rId11"/>
   </p:notesMasterIdLst>
   <p:sldIdLst>
     <p:sldId id="256" r:id="rId2"/>
-    <p:sldId id="257" r:id="rId3"/>
-    <p:sldId id="258" r:id="rId4"/>
-    <p:sldId id="259" r:id="rId5"/>
-    <p:sldId id="261" r:id="rId6"/>
-    <p:sldId id="260" r:id="rId7"/>
+    <p:sldId id="262" r:id="rId3"/>
+    <p:sldId id="257" r:id="rId4"/>
+    <p:sldId id="258" r:id="rId5"/>
+    <p:sldId id="259" r:id="rId6"/>
+    <p:sldId id="261" r:id="rId7"/>
+    <p:sldId id="263" r:id="rId8"/>
+    <p:sldId id="264" r:id="rId9"/>
+    <p:sldId id="260" r:id="rId10"/>
   </p:sldIdLst>
   <p:sldSz cx="12192000" cy="6858000"/>
   <p:notesSz cx="6858000" cy="9144000"/>
@@ -123,11 +126,7 @@
 <file path=ppt/commentAuthors.xml><?xml version="1.0" encoding="utf-8"?>
 <p:cmAuthorLst xmlns:a="http://schemas.openxmlformats.org/drawingml/2006/main" xmlns:r="http://schemas.openxmlformats.org/officeDocument/2006/relationships" xmlns:p="http://schemas.openxmlformats.org/presentationml/2006/main">
   <p:cmAuthor id="1" name="謝承佑" initials="謝承佑" lastIdx="1" clrIdx="0">
-    <p:extLst>
-      <p:ext uri="{19B8F6BF-5375-455C-9EA6-DF929625EA0E}">
-        <p15:presenceInfo xmlns:p15="http://schemas.microsoft.com/office/powerpoint/2012/main" userId="08ee57d722371df4" providerId="Windows Live"/>
-      </p:ext>
-    </p:extLst>
+    <p:extLst/>
   </p:cmAuthor>
 </p:cmAuthorLst>
 </file>
@@ -228,7 +227,7 @@
           <a:p>
             <a:fld id="{466120F5-E4B3-43B3-A31D-5BE791A86142}" type="datetimeFigureOut">
               <a:rPr lang="zh-TW" altLang="en-US" smtClean="0"/>
-              <a:t>2016/12/24</a:t>
+              <a:t>2016/12/25</a:t>
             </a:fld>
             <a:endParaRPr lang="zh-TW" altLang="en-US"/>
           </a:p>
@@ -684,7 +683,7 @@
           <a:p>
             <a:fld id="{9CA43115-D7E0-4DEA-ACDE-924D3D76C597}" type="datetimeFigureOut">
               <a:rPr lang="zh-TW" altLang="en-US" smtClean="0"/>
-              <a:t>2016/12/24</a:t>
+              <a:t>2016/12/25</a:t>
             </a:fld>
             <a:endParaRPr lang="zh-TW" altLang="en-US"/>
           </a:p>
@@ -1022,7 +1021,7 @@
           <a:p>
             <a:fld id="{9CA43115-D7E0-4DEA-ACDE-924D3D76C597}" type="datetimeFigureOut">
               <a:rPr lang="zh-TW" altLang="en-US" smtClean="0"/>
-              <a:t>2016/12/24</a:t>
+              <a:t>2016/12/25</a:t>
             </a:fld>
             <a:endParaRPr lang="zh-TW" altLang="en-US"/>
           </a:p>
@@ -1423,7 +1422,7 @@
           <a:p>
             <a:fld id="{9CA43115-D7E0-4DEA-ACDE-924D3D76C597}" type="datetimeFigureOut">
               <a:rPr lang="zh-TW" altLang="en-US" smtClean="0"/>
-              <a:t>2016/12/24</a:t>
+              <a:t>2016/12/25</a:t>
             </a:fld>
             <a:endParaRPr lang="zh-TW" altLang="en-US"/>
           </a:p>
@@ -1759,7 +1758,7 @@
           <a:p>
             <a:fld id="{9CA43115-D7E0-4DEA-ACDE-924D3D76C597}" type="datetimeFigureOut">
               <a:rPr lang="zh-TW" altLang="en-US" smtClean="0"/>
-              <a:t>2016/12/24</a:t>
+              <a:t>2016/12/25</a:t>
             </a:fld>
             <a:endParaRPr lang="zh-TW" altLang="en-US"/>
           </a:p>
@@ -2079,7 +2078,7 @@
           <a:p>
             <a:fld id="{9CA43115-D7E0-4DEA-ACDE-924D3D76C597}" type="datetimeFigureOut">
               <a:rPr lang="zh-TW" altLang="en-US" smtClean="0"/>
-              <a:t>2016/12/24</a:t>
+              <a:t>2016/12/25</a:t>
             </a:fld>
             <a:endParaRPr lang="zh-TW" altLang="en-US"/>
           </a:p>
@@ -2475,7 +2474,7 @@
           <a:p>
             <a:fld id="{9CA43115-D7E0-4DEA-ACDE-924D3D76C597}" type="datetimeFigureOut">
               <a:rPr lang="zh-TW" altLang="en-US" smtClean="0"/>
-              <a:t>2016/12/24</a:t>
+              <a:t>2016/12/25</a:t>
             </a:fld>
             <a:endParaRPr lang="zh-TW" altLang="en-US"/>
           </a:p>
@@ -2732,7 +2731,7 @@
           <a:p>
             <a:fld id="{9CA43115-D7E0-4DEA-ACDE-924D3D76C597}" type="datetimeFigureOut">
               <a:rPr lang="zh-TW" altLang="en-US" smtClean="0"/>
-              <a:t>2016/12/24</a:t>
+              <a:t>2016/12/25</a:t>
             </a:fld>
             <a:endParaRPr lang="zh-TW" altLang="en-US"/>
           </a:p>
@@ -2994,7 +2993,7 @@
           <a:p>
             <a:fld id="{9CA43115-D7E0-4DEA-ACDE-924D3D76C597}" type="datetimeFigureOut">
               <a:rPr lang="zh-TW" altLang="en-US" smtClean="0"/>
-              <a:t>2016/12/24</a:t>
+              <a:t>2016/12/25</a:t>
             </a:fld>
             <a:endParaRPr lang="zh-TW" altLang="en-US"/>
           </a:p>
@@ -3256,7 +3255,7 @@
           <a:p>
             <a:fld id="{9CA43115-D7E0-4DEA-ACDE-924D3D76C597}" type="datetimeFigureOut">
               <a:rPr lang="zh-TW" altLang="en-US" smtClean="0"/>
-              <a:t>2016/12/24</a:t>
+              <a:t>2016/12/25</a:t>
             </a:fld>
             <a:endParaRPr lang="zh-TW" altLang="en-US"/>
           </a:p>
@@ -3585,7 +3584,7 @@
           <a:p>
             <a:fld id="{9CA43115-D7E0-4DEA-ACDE-924D3D76C597}" type="datetimeFigureOut">
               <a:rPr lang="zh-TW" altLang="en-US" smtClean="0"/>
-              <a:t>2016/12/24</a:t>
+              <a:t>2016/12/25</a:t>
             </a:fld>
             <a:endParaRPr lang="zh-TW" altLang="en-US"/>
           </a:p>
@@ -3908,7 +3907,7 @@
           <a:p>
             <a:fld id="{9CA43115-D7E0-4DEA-ACDE-924D3D76C597}" type="datetimeFigureOut">
               <a:rPr lang="zh-TW" altLang="en-US" smtClean="0"/>
-              <a:t>2016/12/24</a:t>
+              <a:t>2016/12/25</a:t>
             </a:fld>
             <a:endParaRPr lang="zh-TW" altLang="en-US"/>
           </a:p>
@@ -4365,7 +4364,7 @@
           <a:p>
             <a:fld id="{9CA43115-D7E0-4DEA-ACDE-924D3D76C597}" type="datetimeFigureOut">
               <a:rPr lang="zh-TW" altLang="en-US" smtClean="0"/>
-              <a:t>2016/12/24</a:t>
+              <a:t>2016/12/25</a:t>
             </a:fld>
             <a:endParaRPr lang="zh-TW" altLang="en-US"/>
           </a:p>
@@ -4570,7 +4569,7 @@
           <a:p>
             <a:fld id="{9CA43115-D7E0-4DEA-ACDE-924D3D76C597}" type="datetimeFigureOut">
               <a:rPr lang="zh-TW" altLang="en-US" smtClean="0"/>
-              <a:t>2016/12/24</a:t>
+              <a:t>2016/12/25</a:t>
             </a:fld>
             <a:endParaRPr lang="zh-TW" altLang="en-US"/>
           </a:p>
@@ -4747,7 +4746,7 @@
           <a:p>
             <a:fld id="{9CA43115-D7E0-4DEA-ACDE-924D3D76C597}" type="datetimeFigureOut">
               <a:rPr lang="zh-TW" altLang="en-US" smtClean="0"/>
-              <a:t>2016/12/24</a:t>
+              <a:t>2016/12/25</a:t>
             </a:fld>
             <a:endParaRPr lang="zh-TW" altLang="en-US"/>
           </a:p>
@@ -5080,7 +5079,7 @@
           <a:p>
             <a:fld id="{9CA43115-D7E0-4DEA-ACDE-924D3D76C597}" type="datetimeFigureOut">
               <a:rPr lang="zh-TW" altLang="en-US" smtClean="0"/>
-              <a:t>2016/12/24</a:t>
+              <a:t>2016/12/25</a:t>
             </a:fld>
             <a:endParaRPr lang="zh-TW" altLang="en-US"/>
           </a:p>
@@ -5425,7 +5424,7 @@
           <a:p>
             <a:fld id="{9CA43115-D7E0-4DEA-ACDE-924D3D76C597}" type="datetimeFigureOut">
               <a:rPr lang="zh-TW" altLang="en-US" smtClean="0"/>
-              <a:t>2016/12/24</a:t>
+              <a:t>2016/12/25</a:t>
             </a:fld>
             <a:endParaRPr lang="zh-TW" altLang="en-US"/>
           </a:p>
@@ -7542,7 +7541,7 @@
           <a:p>
             <a:fld id="{9CA43115-D7E0-4DEA-ACDE-924D3D76C597}" type="datetimeFigureOut">
               <a:rPr lang="zh-TW" altLang="en-US" smtClean="0"/>
-              <a:t>2016/12/24</a:t>
+              <a:t>2016/12/25</a:t>
             </a:fld>
             <a:endParaRPr lang="zh-TW" altLang="en-US"/>
           </a:p>
@@ -8159,6 +8158,102 @@
 </file>
 
 <file path=ppt/slides/slide2.xml><?xml version="1.0" encoding="utf-8"?>
+<p:sld xmlns:a="http://schemas.openxmlformats.org/drawingml/2006/main" xmlns:r="http://schemas.openxmlformats.org/officeDocument/2006/relationships" xmlns:p="http://schemas.openxmlformats.org/presentationml/2006/main">
+  <p:cSld>
+    <p:spTree>
+      <p:nvGrpSpPr>
+        <p:cNvPr id="1" name=""/>
+        <p:cNvGrpSpPr/>
+        <p:nvPr/>
+      </p:nvGrpSpPr>
+      <p:grpSpPr>
+        <a:xfrm>
+          <a:off x="0" y="0"/>
+          <a:ext cx="0" cy="0"/>
+          <a:chOff x="0" y="0"/>
+          <a:chExt cx="0" cy="0"/>
+        </a:xfrm>
+      </p:grpSpPr>
+      <p:sp>
+        <p:nvSpPr>
+          <p:cNvPr id="2" name="標題 1"/>
+          <p:cNvSpPr>
+            <a:spLocks noGrp="1"/>
+          </p:cNvSpPr>
+          <p:nvPr>
+            <p:ph type="title"/>
+          </p:nvPr>
+        </p:nvSpPr>
+        <p:spPr/>
+        <p:txBody>
+          <a:bodyPr>
+            <a:normAutofit/>
+          </a:bodyPr>
+          <a:lstStyle/>
+          <a:p>
+            <a:r>
+              <a:rPr kumimoji="1" lang="zh-TW" altLang="en-US" sz="4000" dirty="0" smtClean="0"/>
+              <a:t>目標</a:t>
+            </a:r>
+            <a:endParaRPr kumimoji="1" lang="zh-TW" altLang="en-US" sz="4000" dirty="0"/>
+          </a:p>
+        </p:txBody>
+      </p:sp>
+      <p:sp>
+        <p:nvSpPr>
+          <p:cNvPr id="3" name="內容版面配置區 2"/>
+          <p:cNvSpPr>
+            <a:spLocks noGrp="1"/>
+          </p:cNvSpPr>
+          <p:nvPr>
+            <p:ph idx="1"/>
+          </p:nvPr>
+        </p:nvSpPr>
+        <p:spPr/>
+        <p:txBody>
+          <a:bodyPr/>
+          <a:lstStyle/>
+          <a:p>
+            <a:r>
+              <a:rPr kumimoji="1" lang="zh-TW" altLang="en-US" sz="3200" dirty="0" smtClean="0"/>
+              <a:t>人物為主角的背光補償</a:t>
+            </a:r>
+            <a:endParaRPr kumimoji="1" lang="en-US" altLang="zh-TW" sz="3200" dirty="0" smtClean="0"/>
+          </a:p>
+          <a:p>
+            <a:r>
+              <a:rPr kumimoji="1" lang="zh-TW" altLang="en-US" sz="3200" dirty="0" smtClean="0"/>
+              <a:t>避免</a:t>
+            </a:r>
+            <a:r>
+              <a:rPr kumimoji="1" lang="en-US" altLang="zh-TW" sz="3200" dirty="0" smtClean="0"/>
+              <a:t> histogram equalization</a:t>
+            </a:r>
+            <a:r>
+              <a:rPr kumimoji="1" lang="zh-TW" altLang="en-US" sz="3200" dirty="0" smtClean="0"/>
+              <a:t> 造成的過曝</a:t>
+            </a:r>
+            <a:endParaRPr kumimoji="1" lang="en-US" altLang="zh-TW" sz="3200" dirty="0" smtClean="0"/>
+          </a:p>
+          <a:p>
+            <a:endParaRPr kumimoji="1" lang="en-US" altLang="zh-TW" sz="3200" dirty="0"/>
+          </a:p>
+        </p:txBody>
+      </p:sp>
+    </p:spTree>
+    <p:extLst>
+      <p:ext uri="{BB962C8B-B14F-4D97-AF65-F5344CB8AC3E}">
+        <p14:creationId xmlns:p14="http://schemas.microsoft.com/office/powerpoint/2010/main" val="1878134298"/>
+      </p:ext>
+    </p:extLst>
+  </p:cSld>
+  <p:clrMapOvr>
+    <a:masterClrMapping/>
+  </p:clrMapOvr>
+</p:sld>
+</file>
+
+<file path=ppt/slides/slide3.xml><?xml version="1.0" encoding="utf-8"?>
 <p:sld xmlns:a="http://schemas.openxmlformats.org/drawingml/2006/main" xmlns:r="http://schemas.openxmlformats.org/officeDocument/2006/relationships" xmlns:p="http://schemas.openxmlformats.org/presentationml/2006/main">
   <p:cSld>
     <p:spTree>
@@ -9014,7 +9109,7 @@
 </p:sld>
 </file>
 
-<file path=ppt/slides/slide3.xml><?xml version="1.0" encoding="utf-8"?>
+<file path=ppt/slides/slide4.xml><?xml version="1.0" encoding="utf-8"?>
 <p:sld xmlns:a="http://schemas.openxmlformats.org/drawingml/2006/main" xmlns:r="http://schemas.openxmlformats.org/officeDocument/2006/relationships" xmlns:p="http://schemas.openxmlformats.org/presentationml/2006/main">
   <p:cSld>
     <p:spTree>
@@ -10404,7 +10499,7 @@
 </p:sld>
 </file>
 
-<file path=ppt/slides/slide4.xml><?xml version="1.0" encoding="utf-8"?>
+<file path=ppt/slides/slide5.xml><?xml version="1.0" encoding="utf-8"?>
 <p:sld xmlns:a="http://schemas.openxmlformats.org/drawingml/2006/main" xmlns:r="http://schemas.openxmlformats.org/officeDocument/2006/relationships" xmlns:p="http://schemas.openxmlformats.org/presentationml/2006/main">
   <p:cSld>
     <p:spTree>
@@ -10609,16 +10704,10 @@
             <a:p>
               <a:pPr algn="ctr"/>
               <a:r>
-                <a:rPr lang="en-US" altLang="zh-TW" sz="3000" dirty="0" smtClean="0">
-                  <a:latin typeface="BatangChe" panose="02030609000101010101" pitchFamily="49" charset="-127"/>
-                  <a:ea typeface="BatangChe" panose="02030609000101010101" pitchFamily="49" charset="-127"/>
-                </a:rPr>
+                <a:rPr lang="en-US" altLang="zh-TW" sz="3000" dirty="0"/>
                 <a:t>Image</a:t>
               </a:r>
-              <a:endParaRPr lang="zh-TW" altLang="en-US" sz="3000" dirty="0">
-                <a:latin typeface="BatangChe" panose="02030609000101010101" pitchFamily="49" charset="-127"/>
-                <a:ea typeface="BatangChe" panose="02030609000101010101" pitchFamily="49" charset="-127"/>
-              </a:endParaRPr>
+              <a:endParaRPr lang="zh-TW" altLang="en-US" sz="3000" dirty="0"/>
             </a:p>
           </p:txBody>
         </p:sp>
@@ -10954,7 +11043,7 @@
 </p:sld>
 </file>
 
-<file path=ppt/slides/slide5.xml><?xml version="1.0" encoding="utf-8"?>
+<file path=ppt/slides/slide6.xml><?xml version="1.0" encoding="utf-8"?>
 <p:sld xmlns:a="http://schemas.openxmlformats.org/drawingml/2006/main" xmlns:r="http://schemas.openxmlformats.org/officeDocument/2006/relationships" xmlns:p="http://schemas.openxmlformats.org/presentationml/2006/main">
   <p:cSld>
     <p:spTree>
@@ -10986,29 +11075,503 @@
           <a:bodyPr/>
           <a:lstStyle/>
           <a:p>
-            <a:endParaRPr lang="zh-TW" altLang="en-US"/>
+            <a:r>
+              <a:rPr lang="en-US" altLang="zh-TW" dirty="0" smtClean="0"/>
+              <a:t>Transformation Function - 1</a:t>
+            </a:r>
+            <a:endParaRPr lang="zh-TW" altLang="en-US" dirty="0"/>
           </a:p>
         </p:txBody>
       </p:sp>
-      <p:sp>
-        <p:nvSpPr>
-          <p:cNvPr id="3" name="內容版面配置區 2"/>
-          <p:cNvSpPr>
-            <a:spLocks noGrp="1"/>
-          </p:cNvSpPr>
+      <p:pic>
+        <p:nvPicPr>
+          <p:cNvPr id="4" name="內容版面配置區 3"/>
+          <p:cNvPicPr>
+            <a:picLocks noGrp="1" noChangeAspect="1"/>
+          </p:cNvPicPr>
           <p:nvPr>
             <p:ph idx="1"/>
           </p:nvPr>
-        </p:nvSpPr>
-        <p:spPr/>
-        <p:txBody>
-          <a:bodyPr/>
-          <a:lstStyle/>
-          <a:p>
-            <a:endParaRPr lang="zh-TW" altLang="en-US"/>
-          </a:p>
-        </p:txBody>
-      </p:sp>
+        </p:nvPicPr>
+        <p:blipFill>
+          <a:blip r:embed="rId2">
+            <a:extLst>
+              <a:ext uri="{28A0092B-C50C-407E-A947-70E740481C1C}">
+                <a14:useLocalDpi xmlns:a14="http://schemas.microsoft.com/office/drawing/2010/main" val="0"/>
+              </a:ext>
+            </a:extLst>
+          </a:blip>
+          <a:stretch>
+            <a:fillRect/>
+          </a:stretch>
+        </p:blipFill>
+        <p:spPr>
+          <a:xfrm>
+            <a:off x="6489562" y="1507683"/>
+            <a:ext cx="5015050" cy="3446282"/>
+          </a:xfrm>
+          <a:prstGeom prst="rect">
+            <a:avLst/>
+          </a:prstGeom>
+        </p:spPr>
+      </p:pic>
+      <p:cxnSp>
+        <p:nvCxnSpPr>
+          <p:cNvPr id="8" name="直線箭頭接點 7"/>
+          <p:cNvCxnSpPr/>
+          <p:nvPr/>
+        </p:nvCxnSpPr>
+        <p:spPr>
+          <a:xfrm flipH="1">
+            <a:off x="8542116" y="2106592"/>
+            <a:ext cx="243069" cy="752355"/>
+          </a:xfrm>
+          <a:prstGeom prst="straightConnector1">
+            <a:avLst/>
+          </a:prstGeom>
+          <a:ln w="57150">
+            <a:tailEnd type="triangle"/>
+          </a:ln>
+        </p:spPr>
+        <p:style>
+          <a:lnRef idx="1">
+            <a:schemeClr val="accent1"/>
+          </a:lnRef>
+          <a:fillRef idx="0">
+            <a:schemeClr val="accent1"/>
+          </a:fillRef>
+          <a:effectRef idx="0">
+            <a:schemeClr val="accent1"/>
+          </a:effectRef>
+          <a:fontRef idx="minor">
+            <a:schemeClr val="tx1"/>
+          </a:fontRef>
+        </p:style>
+      </p:cxnSp>
+      <mc:AlternateContent xmlns:mc="http://schemas.openxmlformats.org/markup-compatibility/2006">
+        <mc:Choice xmlns:a14="http://schemas.microsoft.com/office/drawing/2010/main" Requires="a14">
+          <p:sp>
+            <p:nvSpPr>
+              <p:cNvPr id="11" name="文字方塊 10"/>
+              <p:cNvSpPr txBox="1"/>
+              <p:nvPr/>
+            </p:nvSpPr>
+            <p:spPr>
+              <a:xfrm>
+                <a:off x="972273" y="1574157"/>
+                <a:ext cx="5822066" cy="2448234"/>
+              </a:xfrm>
+              <a:prstGeom prst="rect">
+                <a:avLst/>
+              </a:prstGeom>
+              <a:noFill/>
+            </p:spPr>
+            <p:txBody>
+              <a:bodyPr wrap="square" rtlCol="0">
+                <a:spAutoFit/>
+              </a:bodyPr>
+              <a:lstStyle/>
+              <a:p>
+                <a14:m>
+                  <m:oMathPara xmlns:m="http://schemas.openxmlformats.org/officeDocument/2006/math">
+                    <m:oMathParaPr>
+                      <m:jc m:val="centerGroup"/>
+                    </m:oMathParaPr>
+                    <m:oMath xmlns:m="http://schemas.openxmlformats.org/officeDocument/2006/math">
+                      <m:sSub>
+                        <m:sSubPr>
+                          <m:ctrlPr>
+                            <a:rPr kumimoji="1" lang="en-US" altLang="zh-TW" sz="2800" i="1" smtClean="0">
+                              <a:latin typeface="Cambria Math" charset="0"/>
+                            </a:rPr>
+                          </m:ctrlPr>
+                        </m:sSubPr>
+                        <m:e>
+                          <m:r>
+                            <a:rPr kumimoji="1" lang="en-US" altLang="zh-TW" sz="2800" b="0" i="1" smtClean="0">
+                              <a:latin typeface="Cambria Math" charset="0"/>
+                            </a:rPr>
+                            <m:t>𝑓</m:t>
+                          </m:r>
+                        </m:e>
+                        <m:sub>
+                          <m:r>
+                            <a:rPr kumimoji="1" lang="en-US" altLang="zh-TW" sz="2800" b="0" i="1" smtClean="0">
+                              <a:latin typeface="Cambria Math" charset="0"/>
+                            </a:rPr>
+                            <m:t>1</m:t>
+                          </m:r>
+                        </m:sub>
+                      </m:sSub>
+                      <m:d>
+                        <m:dPr>
+                          <m:ctrlPr>
+                            <a:rPr kumimoji="1" lang="en-US" altLang="zh-TW" sz="2800" b="0" i="1" smtClean="0">
+                              <a:latin typeface="Cambria Math" charset="0"/>
+                            </a:rPr>
+                          </m:ctrlPr>
+                        </m:dPr>
+                        <m:e>
+                          <m:r>
+                            <a:rPr kumimoji="1" lang="en-US" altLang="zh-TW" sz="2800" b="0" i="1" smtClean="0">
+                              <a:latin typeface="Cambria Math" charset="0"/>
+                            </a:rPr>
+                            <m:t>𝑥</m:t>
+                          </m:r>
+                        </m:e>
+                      </m:d>
+                      <m:r>
+                        <a:rPr kumimoji="1" lang="en-US" altLang="zh-TW" sz="2800" b="0" i="1" smtClean="0">
+                          <a:latin typeface="Cambria Math" charset="0"/>
+                        </a:rPr>
+                        <m:t>=</m:t>
+                      </m:r>
+                      <m:f>
+                        <m:fPr>
+                          <m:ctrlPr>
+                            <a:rPr kumimoji="1" lang="mr-IN" altLang="zh-TW" sz="2800" i="1" dirty="0" smtClean="0">
+                              <a:latin typeface="Cambria Math" charset="0"/>
+                            </a:rPr>
+                          </m:ctrlPr>
+                        </m:fPr>
+                        <m:num>
+                          <m:r>
+                            <a:rPr kumimoji="1" lang="en-US" altLang="zh-TW" sz="2800" b="0" i="1" dirty="0" smtClean="0">
+                              <a:latin typeface="Cambria Math" charset="0"/>
+                            </a:rPr>
+                            <m:t>−</m:t>
+                          </m:r>
+                          <m:r>
+                            <a:rPr kumimoji="1" lang="en-US" altLang="zh-TW" sz="2800" b="0" i="1" dirty="0" smtClean="0">
+                              <a:latin typeface="Cambria Math" charset="0"/>
+                            </a:rPr>
+                            <m:t>𝑏</m:t>
+                          </m:r>
+                        </m:num>
+                        <m:den>
+                          <m:sSup>
+                            <m:sSupPr>
+                              <m:ctrlPr>
+                                <a:rPr kumimoji="1" lang="mr-IN" altLang="zh-TW" sz="2800" i="1" dirty="0" smtClean="0">
+                                  <a:latin typeface="Cambria Math" charset="0"/>
+                                </a:rPr>
+                              </m:ctrlPr>
+                            </m:sSupPr>
+                            <m:e>
+                              <m:r>
+                                <a:rPr kumimoji="1" lang="en-US" altLang="zh-TW" sz="2800" b="0" i="1" dirty="0" smtClean="0">
+                                  <a:latin typeface="Cambria Math" charset="0"/>
+                                </a:rPr>
+                                <m:t>𝑎</m:t>
+                              </m:r>
+                            </m:e>
+                            <m:sup>
+                              <m:r>
+                                <a:rPr kumimoji="1" lang="en-US" altLang="zh-TW" sz="2800" b="0" i="1" dirty="0" smtClean="0">
+                                  <a:latin typeface="Cambria Math" charset="0"/>
+                                </a:rPr>
+                                <m:t>2</m:t>
+                              </m:r>
+                            </m:sup>
+                          </m:sSup>
+                        </m:den>
+                      </m:f>
+                      <m:sSup>
+                        <m:sSupPr>
+                          <m:ctrlPr>
+                            <a:rPr kumimoji="1" lang="en-US" altLang="zh-TW" sz="2800" b="0" i="1" dirty="0" smtClean="0">
+                              <a:latin typeface="Cambria Math" charset="0"/>
+                            </a:rPr>
+                          </m:ctrlPr>
+                        </m:sSupPr>
+                        <m:e>
+                          <m:r>
+                            <a:rPr kumimoji="1" lang="en-US" altLang="zh-TW" sz="2800" i="1" dirty="0">
+                              <a:latin typeface="Cambria Math" charset="0"/>
+                            </a:rPr>
+                            <m:t>(</m:t>
+                          </m:r>
+                          <m:r>
+                            <a:rPr kumimoji="1" lang="en-US" altLang="zh-TW" sz="2800" i="1" dirty="0">
+                              <a:latin typeface="Cambria Math" charset="0"/>
+                            </a:rPr>
+                            <m:t>𝑥</m:t>
+                          </m:r>
+                          <m:r>
+                            <a:rPr kumimoji="1" lang="en-US" altLang="zh-TW" sz="2800" i="1" dirty="0">
+                              <a:latin typeface="Cambria Math" charset="0"/>
+                            </a:rPr>
+                            <m:t>−</m:t>
+                          </m:r>
+                          <m:r>
+                            <a:rPr kumimoji="1" lang="en-US" altLang="zh-TW" sz="2800" i="1" dirty="0">
+                              <a:latin typeface="Cambria Math" charset="0"/>
+                            </a:rPr>
+                            <m:t>𝑎</m:t>
+                          </m:r>
+                          <m:r>
+                            <a:rPr kumimoji="1" lang="en-US" altLang="zh-TW" sz="2800" i="1" dirty="0">
+                              <a:latin typeface="Cambria Math" charset="0"/>
+                            </a:rPr>
+                            <m:t>)</m:t>
+                          </m:r>
+                        </m:e>
+                        <m:sup>
+                          <m:r>
+                            <a:rPr kumimoji="1" lang="en-US" altLang="zh-TW" sz="2800" b="0" i="1" dirty="0" smtClean="0">
+                              <a:latin typeface="Cambria Math" charset="0"/>
+                            </a:rPr>
+                            <m:t>2</m:t>
+                          </m:r>
+                        </m:sup>
+                      </m:sSup>
+                      <m:r>
+                        <a:rPr kumimoji="1" lang="en-US" altLang="zh-TW" sz="2800" b="0" i="1" dirty="0" smtClean="0">
+                          <a:latin typeface="Cambria Math" charset="0"/>
+                        </a:rPr>
+                        <m:t>+</m:t>
+                      </m:r>
+                      <m:r>
+                        <a:rPr kumimoji="1" lang="en-US" altLang="zh-TW" sz="2800" b="0" i="1" dirty="0" smtClean="0">
+                          <a:latin typeface="Cambria Math" charset="0"/>
+                        </a:rPr>
+                        <m:t>𝑏</m:t>
+                      </m:r>
+                    </m:oMath>
+                  </m:oMathPara>
+                </a14:m>
+                <a:endParaRPr kumimoji="1" lang="en-US" altLang="zh-TW" sz="2800" b="0" dirty="0" smtClean="0"/>
+              </a:p>
+              <a:p>
+                <a:endParaRPr kumimoji="1" lang="en-US" altLang="zh-TW" sz="2800" dirty="0" smtClean="0"/>
+              </a:p>
+              <a:p>
+                <a:r>
+                  <a:rPr kumimoji="1" lang="en-US" altLang="zh-TW" sz="2800" dirty="0" smtClean="0"/>
+                  <a:t>	</a:t>
+                </a:r>
+                <a14:m>
+                  <m:oMath xmlns:m="http://schemas.openxmlformats.org/officeDocument/2006/math">
+                    <m:sSub>
+                      <m:sSubPr>
+                        <m:ctrlPr>
+                          <a:rPr kumimoji="1" lang="en-US" altLang="zh-TW" sz="2800" i="1" smtClean="0">
+                            <a:latin typeface="Cambria Math" charset="0"/>
+                          </a:rPr>
+                        </m:ctrlPr>
+                      </m:sSubPr>
+                      <m:e>
+                        <m:r>
+                          <a:rPr kumimoji="1" lang="en-US" altLang="zh-TW" sz="2800" b="0" i="1" smtClean="0">
+                            <a:latin typeface="Cambria Math" charset="0"/>
+                          </a:rPr>
+                          <m:t>𝑓</m:t>
+                        </m:r>
+                      </m:e>
+                      <m:sub>
+                        <m:r>
+                          <a:rPr kumimoji="1" lang="en-US" altLang="zh-TW" sz="2800" b="0" i="1" smtClean="0">
+                            <a:latin typeface="Cambria Math" charset="0"/>
+                          </a:rPr>
+                          <m:t>2</m:t>
+                        </m:r>
+                      </m:sub>
+                    </m:sSub>
+                    <m:d>
+                      <m:dPr>
+                        <m:ctrlPr>
+                          <a:rPr kumimoji="1" lang="en-US" altLang="zh-TW" sz="2800" b="0" i="1" smtClean="0">
+                            <a:latin typeface="Cambria Math" charset="0"/>
+                          </a:rPr>
+                        </m:ctrlPr>
+                      </m:dPr>
+                      <m:e>
+                        <m:r>
+                          <a:rPr kumimoji="1" lang="en-US" altLang="zh-TW" sz="2800" b="0" i="1" smtClean="0">
+                            <a:latin typeface="Cambria Math" charset="0"/>
+                          </a:rPr>
+                          <m:t>𝑥</m:t>
+                        </m:r>
+                      </m:e>
+                    </m:d>
+                    <m:r>
+                      <a:rPr kumimoji="1" lang="en-US" altLang="zh-TW" sz="2800" b="0" i="1" smtClean="0">
+                        <a:latin typeface="Cambria Math" charset="0"/>
+                      </a:rPr>
+                      <m:t>=</m:t>
+                    </m:r>
+                    <m:f>
+                      <m:fPr>
+                        <m:ctrlPr>
+                          <a:rPr kumimoji="1" lang="mr-IN" altLang="zh-TW" sz="2800" b="0" i="1" smtClean="0">
+                            <a:latin typeface="Cambria Math" charset="0"/>
+                          </a:rPr>
+                        </m:ctrlPr>
+                      </m:fPr>
+                      <m:num>
+                        <m:r>
+                          <a:rPr kumimoji="1" lang="en-US" altLang="zh-TW" sz="2800" b="0" i="1" smtClean="0">
+                            <a:latin typeface="Cambria Math" charset="0"/>
+                          </a:rPr>
+                          <m:t>255−</m:t>
+                        </m:r>
+                        <m:r>
+                          <a:rPr kumimoji="1" lang="en-US" altLang="zh-TW" sz="2800" b="0" i="1" smtClean="0">
+                            <a:latin typeface="Cambria Math" charset="0"/>
+                          </a:rPr>
+                          <m:t>𝑏</m:t>
+                        </m:r>
+                      </m:num>
+                      <m:den>
+                        <m:sSup>
+                          <m:sSupPr>
+                            <m:ctrlPr>
+                              <a:rPr kumimoji="1" lang="mr-IN" altLang="zh-TW" sz="2800" b="0" i="1" smtClean="0">
+                                <a:latin typeface="Cambria Math" charset="0"/>
+                              </a:rPr>
+                            </m:ctrlPr>
+                          </m:sSupPr>
+                          <m:e>
+                            <m:r>
+                              <a:rPr kumimoji="1" lang="en-US" altLang="zh-TW" sz="2800" b="0" i="1" smtClean="0">
+                                <a:latin typeface="Cambria Math" charset="0"/>
+                              </a:rPr>
+                              <m:t>(255−</m:t>
+                            </m:r>
+                            <m:r>
+                              <a:rPr kumimoji="1" lang="en-US" altLang="zh-TW" sz="2800" b="0" i="1" smtClean="0">
+                                <a:latin typeface="Cambria Math" charset="0"/>
+                              </a:rPr>
+                              <m:t>𝑎</m:t>
+                            </m:r>
+                            <m:r>
+                              <a:rPr kumimoji="1" lang="en-US" altLang="zh-TW" sz="2800" b="0" i="1" smtClean="0">
+                                <a:latin typeface="Cambria Math" charset="0"/>
+                              </a:rPr>
+                              <m:t>)</m:t>
+                            </m:r>
+                          </m:e>
+                          <m:sup>
+                            <m:r>
+                              <a:rPr kumimoji="1" lang="en-US" altLang="zh-TW" sz="2800" b="0" i="1" smtClean="0">
+                                <a:latin typeface="Cambria Math" charset="0"/>
+                              </a:rPr>
+                              <m:t>2</m:t>
+                            </m:r>
+                          </m:sup>
+                        </m:sSup>
+                      </m:den>
+                    </m:f>
+                    <m:sSup>
+                      <m:sSupPr>
+                        <m:ctrlPr>
+                          <a:rPr kumimoji="1" lang="mr-IN" altLang="zh-TW" sz="2800" b="0" i="1" smtClean="0">
+                            <a:latin typeface="Cambria Math" charset="0"/>
+                          </a:rPr>
+                        </m:ctrlPr>
+                      </m:sSupPr>
+                      <m:e>
+                        <m:r>
+                          <a:rPr kumimoji="1" lang="en-US" altLang="zh-TW" sz="2800" b="0" i="1" smtClean="0">
+                            <a:latin typeface="Cambria Math" charset="0"/>
+                          </a:rPr>
+                          <m:t>(</m:t>
+                        </m:r>
+                        <m:r>
+                          <a:rPr kumimoji="1" lang="en-US" altLang="zh-TW" sz="2800" b="0" i="1" smtClean="0">
+                            <a:latin typeface="Cambria Math" charset="0"/>
+                          </a:rPr>
+                          <m:t>𝑥</m:t>
+                        </m:r>
+                        <m:r>
+                          <a:rPr kumimoji="1" lang="en-US" altLang="zh-TW" sz="2800" b="0" i="1" smtClean="0">
+                            <a:latin typeface="Cambria Math" charset="0"/>
+                          </a:rPr>
+                          <m:t>−</m:t>
+                        </m:r>
+                        <m:r>
+                          <a:rPr kumimoji="1" lang="en-US" altLang="zh-TW" sz="2800" b="0" i="1" smtClean="0">
+                            <a:latin typeface="Cambria Math" charset="0"/>
+                          </a:rPr>
+                          <m:t>𝑎</m:t>
+                        </m:r>
+                        <m:r>
+                          <a:rPr kumimoji="1" lang="en-US" altLang="zh-TW" sz="2800" b="0" i="1" smtClean="0">
+                            <a:latin typeface="Cambria Math" charset="0"/>
+                          </a:rPr>
+                          <m:t>)</m:t>
+                        </m:r>
+                      </m:e>
+                      <m:sup>
+                        <m:r>
+                          <a:rPr kumimoji="1" lang="en-US" altLang="zh-TW" sz="2800" b="0" i="1" smtClean="0">
+                            <a:latin typeface="Cambria Math" charset="0"/>
+                          </a:rPr>
+                          <m:t>2</m:t>
+                        </m:r>
+                      </m:sup>
+                    </m:sSup>
+                    <m:r>
+                      <a:rPr kumimoji="1" lang="en-US" altLang="zh-TW" sz="2800" b="0" i="1" smtClean="0">
+                        <a:latin typeface="Cambria Math" charset="0"/>
+                      </a:rPr>
+                      <m:t>+</m:t>
+                    </m:r>
+                    <m:r>
+                      <a:rPr kumimoji="1" lang="en-US" altLang="zh-TW" sz="2800" b="0" i="1" smtClean="0">
+                        <a:latin typeface="Cambria Math" charset="0"/>
+                      </a:rPr>
+                      <m:t>𝑏</m:t>
+                    </m:r>
+                  </m:oMath>
+                </a14:m>
+                <a:endParaRPr kumimoji="1" lang="en-US" altLang="zh-TW" sz="2800" b="0" dirty="0" smtClean="0"/>
+              </a:p>
+              <a:p>
+                <a:endParaRPr kumimoji="1" lang="en-US" altLang="zh-TW" sz="2800" dirty="0" smtClean="0"/>
+              </a:p>
+            </p:txBody>
+          </p:sp>
+        </mc:Choice>
+        <mc:Fallback>
+          <p:sp>
+            <p:nvSpPr>
+              <p:cNvPr id="11" name="文字方塊 10"/>
+              <p:cNvSpPr txBox="1">
+                <a:spLocks noRot="1" noChangeAspect="1" noMove="1" noResize="1" noEditPoints="1" noAdjustHandles="1" noChangeArrowheads="1" noChangeShapeType="1" noTextEdit="1"/>
+              </p:cNvSpPr>
+              <p:nvPr/>
+            </p:nvSpPr>
+            <p:spPr>
+              <a:xfrm>
+                <a:off x="972273" y="1574157"/>
+                <a:ext cx="5822066" cy="2448234"/>
+              </a:xfrm>
+              <a:prstGeom prst="rect">
+                <a:avLst/>
+              </a:prstGeom>
+              <a:blipFill rotWithShape="0">
+                <a:blip r:embed="rId3"/>
+                <a:stretch>
+                  <a:fillRect/>
+                </a:stretch>
+              </a:blipFill>
+            </p:spPr>
+            <p:txBody>
+              <a:bodyPr/>
+              <a:lstStyle/>
+              <a:p>
+                <a:r>
+                  <a:rPr lang="zh-TW" altLang="en-US">
+                    <a:noFill/>
+                  </a:rPr>
+                  <a:t> </a:t>
+                </a:r>
+              </a:p>
+            </p:txBody>
+          </p:sp>
+        </mc:Fallback>
+      </mc:AlternateContent>
     </p:spTree>
     <p:extLst>
       <p:ext uri="{BB962C8B-B14F-4D97-AF65-F5344CB8AC3E}">
@@ -11019,10 +11582,574 @@
   <p:clrMapOvr>
     <a:masterClrMapping/>
   </p:clrMapOvr>
+  <p:timing>
+    <p:tnLst>
+      <p:par>
+        <p:cTn id="1" dur="indefinite" restart="never" nodeType="tmRoot">
+          <p:childTnLst>
+            <p:seq concurrent="1" nextAc="seek">
+              <p:cTn id="2" dur="indefinite" nodeType="mainSeq">
+                <p:childTnLst>
+                  <p:par>
+                    <p:cTn id="3" fill="hold">
+                      <p:stCondLst>
+                        <p:cond delay="indefinite"/>
+                        <p:cond evt="onBegin" delay="0">
+                          <p:tn val="2"/>
+                        </p:cond>
+                      </p:stCondLst>
+                      <p:childTnLst>
+                        <p:par>
+                          <p:cTn id="4" fill="hold">
+                            <p:stCondLst>
+                              <p:cond delay="0"/>
+                            </p:stCondLst>
+                            <p:childTnLst>
+                              <p:par>
+                                <p:cTn id="5" presetID="6" presetClass="entr" presetSubtype="16" fill="hold" nodeType="withEffect">
+                                  <p:stCondLst>
+                                    <p:cond delay="0"/>
+                                  </p:stCondLst>
+                                  <p:childTnLst>
+                                    <p:set>
+                                      <p:cBhvr>
+                                        <p:cTn id="6" dur="1" fill="hold">
+                                          <p:stCondLst>
+                                            <p:cond delay="0"/>
+                                          </p:stCondLst>
+                                        </p:cTn>
+                                        <p:tgtEl>
+                                          <p:spTgt spid="4"/>
+                                        </p:tgtEl>
+                                        <p:attrNameLst>
+                                          <p:attrName>style.visibility</p:attrName>
+                                        </p:attrNameLst>
+                                      </p:cBhvr>
+                                      <p:to>
+                                        <p:strVal val="visible"/>
+                                      </p:to>
+                                    </p:set>
+                                    <p:animEffect transition="in" filter="circle(in)">
+                                      <p:cBhvr>
+                                        <p:cTn id="7" dur="2000"/>
+                                        <p:tgtEl>
+                                          <p:spTgt spid="4"/>
+                                        </p:tgtEl>
+                                      </p:cBhvr>
+                                    </p:animEffect>
+                                  </p:childTnLst>
+                                </p:cTn>
+                              </p:par>
+                            </p:childTnLst>
+                          </p:cTn>
+                        </p:par>
+                      </p:childTnLst>
+                    </p:cTn>
+                  </p:par>
+                </p:childTnLst>
+              </p:cTn>
+              <p:prevCondLst>
+                <p:cond evt="onPrev" delay="0">
+                  <p:tgtEl>
+                    <p:sldTgt/>
+                  </p:tgtEl>
+                </p:cond>
+              </p:prevCondLst>
+              <p:nextCondLst>
+                <p:cond evt="onNext" delay="0">
+                  <p:tgtEl>
+                    <p:sldTgt/>
+                  </p:tgtEl>
+                </p:cond>
+              </p:nextCondLst>
+            </p:seq>
+          </p:childTnLst>
+        </p:cTn>
+      </p:par>
+    </p:tnLst>
+  </p:timing>
 </p:sld>
 </file>
 
-<file path=ppt/slides/slide6.xml><?xml version="1.0" encoding="utf-8"?>
+<file path=ppt/slides/slide7.xml><?xml version="1.0" encoding="utf-8"?>
+<p:sld xmlns:a="http://schemas.openxmlformats.org/drawingml/2006/main" xmlns:r="http://schemas.openxmlformats.org/officeDocument/2006/relationships" xmlns:p="http://schemas.openxmlformats.org/presentationml/2006/main">
+  <p:cSld>
+    <p:spTree>
+      <p:nvGrpSpPr>
+        <p:cNvPr id="1" name=""/>
+        <p:cNvGrpSpPr/>
+        <p:nvPr/>
+      </p:nvGrpSpPr>
+      <p:grpSpPr>
+        <a:xfrm>
+          <a:off x="0" y="0"/>
+          <a:ext cx="0" cy="0"/>
+          <a:chOff x="0" y="0"/>
+          <a:chExt cx="0" cy="0"/>
+        </a:xfrm>
+      </p:grpSpPr>
+      <p:sp>
+        <p:nvSpPr>
+          <p:cNvPr id="2" name="標題 1"/>
+          <p:cNvSpPr>
+            <a:spLocks noGrp="1"/>
+          </p:cNvSpPr>
+          <p:nvPr>
+            <p:ph type="title"/>
+          </p:nvPr>
+        </p:nvSpPr>
+        <p:spPr/>
+        <p:txBody>
+          <a:bodyPr/>
+          <a:lstStyle/>
+          <a:p>
+            <a:r>
+              <a:rPr kumimoji="1" lang="en-US" altLang="zh-TW" dirty="0" smtClean="0"/>
+              <a:t>Transformation Function - 2</a:t>
+            </a:r>
+            <a:endParaRPr kumimoji="1" lang="zh-TW" altLang="en-US" dirty="0"/>
+          </a:p>
+        </p:txBody>
+      </p:sp>
+      <p:pic>
+        <p:nvPicPr>
+          <p:cNvPr id="5" name="圖片 4"/>
+          <p:cNvPicPr>
+            <a:picLocks noChangeAspect="1"/>
+          </p:cNvPicPr>
+          <p:nvPr/>
+        </p:nvPicPr>
+        <p:blipFill>
+          <a:blip r:embed="rId2">
+            <a:extLst>
+              <a:ext uri="{28A0092B-C50C-407E-A947-70E740481C1C}">
+                <a14:useLocalDpi xmlns:a14="http://schemas.microsoft.com/office/drawing/2010/main" val="0"/>
+              </a:ext>
+            </a:extLst>
+          </a:blip>
+          <a:stretch>
+            <a:fillRect/>
+          </a:stretch>
+        </p:blipFill>
+        <p:spPr>
+          <a:xfrm>
+            <a:off x="6553200" y="4406606"/>
+            <a:ext cx="5638800" cy="2349500"/>
+          </a:xfrm>
+          <a:prstGeom prst="rect">
+            <a:avLst/>
+          </a:prstGeom>
+        </p:spPr>
+      </p:pic>
+      <p:pic>
+        <p:nvPicPr>
+          <p:cNvPr id="7" name="內容版面配置區 3"/>
+          <p:cNvPicPr>
+            <a:picLocks noChangeAspect="1"/>
+          </p:cNvPicPr>
+          <p:nvPr/>
+        </p:nvPicPr>
+        <p:blipFill>
+          <a:blip r:embed="rId3">
+            <a:extLst>
+              <a:ext uri="{28A0092B-C50C-407E-A947-70E740481C1C}">
+                <a14:useLocalDpi xmlns:a14="http://schemas.microsoft.com/office/drawing/2010/main" val="0"/>
+              </a:ext>
+            </a:extLst>
+          </a:blip>
+          <a:stretch>
+            <a:fillRect/>
+          </a:stretch>
+        </p:blipFill>
+        <p:spPr>
+          <a:xfrm>
+            <a:off x="1620453" y="3463584"/>
+            <a:ext cx="4791297" cy="3292522"/>
+          </a:xfrm>
+          <a:prstGeom prst="rect">
+            <a:avLst/>
+          </a:prstGeom>
+        </p:spPr>
+      </p:pic>
+      <mc:AlternateContent xmlns:mc="http://schemas.openxmlformats.org/markup-compatibility/2006">
+        <mc:Choice xmlns:a14="http://schemas.microsoft.com/office/drawing/2010/main" Requires="a14">
+          <p:sp>
+            <p:nvSpPr>
+              <p:cNvPr id="9" name="矩形 8"/>
+              <p:cNvSpPr/>
+              <p:nvPr/>
+            </p:nvSpPr>
+            <p:spPr>
+              <a:xfrm>
+                <a:off x="1620453" y="2099516"/>
+                <a:ext cx="3960275" cy="584775"/>
+              </a:xfrm>
+              <a:prstGeom prst="rect">
+                <a:avLst/>
+              </a:prstGeom>
+            </p:spPr>
+            <p:txBody>
+              <a:bodyPr wrap="square">
+                <a:spAutoFit/>
+              </a:bodyPr>
+              <a:lstStyle/>
+              <a:p>
+                <a:pPr/>
+                <a14:m>
+                  <m:oMathPara xmlns:m="http://schemas.openxmlformats.org/officeDocument/2006/math">
+                    <m:oMathParaPr>
+                      <m:jc m:val="centerGroup"/>
+                    </m:oMathParaPr>
+                    <m:oMath xmlns:m="http://schemas.openxmlformats.org/officeDocument/2006/math">
+                      <m:d>
+                        <m:dPr>
+                          <m:ctrlPr>
+                            <a:rPr kumimoji="1" lang="en-US" altLang="zh-TW" sz="3200" i="1">
+                              <a:latin typeface="Cambria Math" charset="0"/>
+                            </a:rPr>
+                          </m:ctrlPr>
+                        </m:dPr>
+                        <m:e>
+                          <m:r>
+                            <a:rPr kumimoji="1" lang="en-US" altLang="zh-TW" sz="3200" i="1">
+                              <a:latin typeface="Cambria Math" charset="0"/>
+                            </a:rPr>
+                            <m:t>𝑎</m:t>
+                          </m:r>
+                          <m:r>
+                            <a:rPr kumimoji="1" lang="en-US" altLang="zh-TW" sz="3200" i="1">
+                              <a:latin typeface="Cambria Math" charset="0"/>
+                            </a:rPr>
+                            <m:t>, </m:t>
+                          </m:r>
+                          <m:r>
+                            <a:rPr kumimoji="1" lang="en-US" altLang="zh-TW" sz="3200" i="1">
+                              <a:latin typeface="Cambria Math" charset="0"/>
+                            </a:rPr>
+                            <m:t>𝑏</m:t>
+                          </m:r>
+                        </m:e>
+                      </m:d>
+                      <m:r>
+                        <a:rPr kumimoji="1" lang="en-US" altLang="zh-TW" sz="3200" i="1">
+                          <a:latin typeface="Cambria Math" charset="0"/>
+                        </a:rPr>
+                        <m:t>=(</m:t>
+                      </m:r>
+                      <m:sSub>
+                        <m:sSubPr>
+                          <m:ctrlPr>
+                            <a:rPr kumimoji="1" lang="en-US" altLang="zh-TW" sz="3200" i="1">
+                              <a:latin typeface="Cambria Math" charset="0"/>
+                            </a:rPr>
+                          </m:ctrlPr>
+                        </m:sSubPr>
+                        <m:e>
+                          <m:r>
+                            <a:rPr kumimoji="1" lang="en-US" altLang="zh-TW" sz="3200" i="1">
+                              <a:latin typeface="Cambria Math" charset="0"/>
+                            </a:rPr>
+                            <m:t>𝐹𝐿</m:t>
+                          </m:r>
+                        </m:e>
+                        <m:sub>
+                          <m:r>
+                            <a:rPr kumimoji="1" lang="en-US" altLang="zh-TW" sz="3200" i="1">
+                              <a:latin typeface="Cambria Math" charset="0"/>
+                            </a:rPr>
+                            <m:t>𝑚</m:t>
+                          </m:r>
+                        </m:sub>
+                      </m:sSub>
+                      <m:r>
+                        <a:rPr kumimoji="1" lang="en-US" altLang="zh-TW" sz="3200" i="1">
+                          <a:latin typeface="Cambria Math" charset="0"/>
+                        </a:rPr>
+                        <m:t>, </m:t>
+                      </m:r>
+                      <m:sSub>
+                        <m:sSubPr>
+                          <m:ctrlPr>
+                            <a:rPr kumimoji="1" lang="en-US" altLang="zh-TW" sz="3200" i="1">
+                              <a:latin typeface="Cambria Math" charset="0"/>
+                            </a:rPr>
+                          </m:ctrlPr>
+                        </m:sSubPr>
+                        <m:e>
+                          <m:r>
+                            <a:rPr kumimoji="1" lang="en-US" altLang="zh-TW" sz="3200" i="1">
+                              <a:latin typeface="Cambria Math" charset="0"/>
+                            </a:rPr>
+                            <m:t>𝐻</m:t>
+                          </m:r>
+                        </m:e>
+                        <m:sub>
+                          <m:r>
+                            <a:rPr kumimoji="1" lang="en-US" altLang="zh-TW" sz="3200" i="1">
+                              <a:latin typeface="Cambria Math" charset="0"/>
+                            </a:rPr>
+                            <m:t>𝑚</m:t>
+                          </m:r>
+                        </m:sub>
+                      </m:sSub>
+                      <m:r>
+                        <a:rPr kumimoji="1" lang="en-US" altLang="zh-TW" sz="3200" i="1">
+                          <a:latin typeface="Cambria Math" charset="0"/>
+                        </a:rPr>
+                        <m:t>)</m:t>
+                      </m:r>
+                    </m:oMath>
+                  </m:oMathPara>
+                </a14:m>
+                <a:endParaRPr kumimoji="1" lang="zh-TW" altLang="en-US" sz="3200" dirty="0"/>
+              </a:p>
+            </p:txBody>
+          </p:sp>
+        </mc:Choice>
+        <mc:Fallback>
+          <p:sp>
+            <p:nvSpPr>
+              <p:cNvPr id="9" name="矩形 8"/>
+              <p:cNvSpPr>
+                <a:spLocks noRot="1" noChangeAspect="1" noMove="1" noResize="1" noEditPoints="1" noAdjustHandles="1" noChangeArrowheads="1" noChangeShapeType="1" noTextEdit="1"/>
+              </p:cNvSpPr>
+              <p:nvPr/>
+            </p:nvSpPr>
+            <p:spPr>
+              <a:xfrm>
+                <a:off x="1620453" y="2099516"/>
+                <a:ext cx="3960275" cy="584775"/>
+              </a:xfrm>
+              <a:prstGeom prst="rect">
+                <a:avLst/>
+              </a:prstGeom>
+              <a:blipFill rotWithShape="0">
+                <a:blip r:embed="rId4"/>
+                <a:stretch>
+                  <a:fillRect/>
+                </a:stretch>
+              </a:blipFill>
+            </p:spPr>
+            <p:txBody>
+              <a:bodyPr/>
+              <a:lstStyle/>
+              <a:p>
+                <a:r>
+                  <a:rPr lang="zh-TW" altLang="en-US">
+                    <a:noFill/>
+                  </a:rPr>
+                  <a:t> </a:t>
+                </a:r>
+              </a:p>
+            </p:txBody>
+          </p:sp>
+        </mc:Fallback>
+      </mc:AlternateContent>
+      <p:cxnSp>
+        <p:nvCxnSpPr>
+          <p:cNvPr id="10" name="直線箭頭接點 9"/>
+          <p:cNvCxnSpPr/>
+          <p:nvPr/>
+        </p:nvCxnSpPr>
+        <p:spPr>
+          <a:xfrm flipH="1">
+            <a:off x="3600590" y="4030428"/>
+            <a:ext cx="243069" cy="752355"/>
+          </a:xfrm>
+          <a:prstGeom prst="straightConnector1">
+            <a:avLst/>
+          </a:prstGeom>
+          <a:ln w="57150">
+            <a:tailEnd type="triangle"/>
+          </a:ln>
+        </p:spPr>
+        <p:style>
+          <a:lnRef idx="1">
+            <a:schemeClr val="accent1"/>
+          </a:lnRef>
+          <a:fillRef idx="0">
+            <a:schemeClr val="accent1"/>
+          </a:fillRef>
+          <a:effectRef idx="0">
+            <a:schemeClr val="accent1"/>
+          </a:effectRef>
+          <a:fontRef idx="minor">
+            <a:schemeClr val="tx1"/>
+          </a:fontRef>
+        </p:style>
+      </p:cxnSp>
+    </p:spTree>
+    <p:extLst>
+      <p:ext uri="{BB962C8B-B14F-4D97-AF65-F5344CB8AC3E}">
+        <p14:creationId xmlns:p14="http://schemas.microsoft.com/office/powerpoint/2010/main" val="1568649597"/>
+      </p:ext>
+    </p:extLst>
+  </p:cSld>
+  <p:clrMapOvr>
+    <a:masterClrMapping/>
+  </p:clrMapOvr>
+  <p:timing>
+    <p:tnLst>
+      <p:par>
+        <p:cTn id="1" dur="indefinite" restart="never" nodeType="tmRoot">
+          <p:childTnLst>
+            <p:seq concurrent="1" nextAc="seek">
+              <p:cTn id="2" dur="indefinite" nodeType="mainSeq">
+                <p:childTnLst>
+                  <p:par>
+                    <p:cTn id="3" fill="hold">
+                      <p:stCondLst>
+                        <p:cond delay="indefinite"/>
+                        <p:cond evt="onBegin" delay="0">
+                          <p:tn val="2"/>
+                        </p:cond>
+                      </p:stCondLst>
+                      <p:childTnLst>
+                        <p:par>
+                          <p:cTn id="4" fill="hold">
+                            <p:stCondLst>
+                              <p:cond delay="0"/>
+                            </p:stCondLst>
+                            <p:childTnLst>
+                              <p:par>
+                                <p:cTn id="5" presetID="6" presetClass="entr" presetSubtype="16" fill="hold" nodeType="withEffect">
+                                  <p:stCondLst>
+                                    <p:cond delay="0"/>
+                                  </p:stCondLst>
+                                  <p:childTnLst>
+                                    <p:set>
+                                      <p:cBhvr>
+                                        <p:cTn id="6" dur="1" fill="hold">
+                                          <p:stCondLst>
+                                            <p:cond delay="0"/>
+                                          </p:stCondLst>
+                                        </p:cTn>
+                                        <p:tgtEl>
+                                          <p:spTgt spid="7"/>
+                                        </p:tgtEl>
+                                        <p:attrNameLst>
+                                          <p:attrName>style.visibility</p:attrName>
+                                        </p:attrNameLst>
+                                      </p:cBhvr>
+                                      <p:to>
+                                        <p:strVal val="visible"/>
+                                      </p:to>
+                                    </p:set>
+                                    <p:animEffect transition="in" filter="circle(in)">
+                                      <p:cBhvr>
+                                        <p:cTn id="7" dur="2000"/>
+                                        <p:tgtEl>
+                                          <p:spTgt spid="7"/>
+                                        </p:tgtEl>
+                                      </p:cBhvr>
+                                    </p:animEffect>
+                                  </p:childTnLst>
+                                </p:cTn>
+                              </p:par>
+                            </p:childTnLst>
+                          </p:cTn>
+                        </p:par>
+                      </p:childTnLst>
+                    </p:cTn>
+                  </p:par>
+                </p:childTnLst>
+              </p:cTn>
+              <p:prevCondLst>
+                <p:cond evt="onPrev" delay="0">
+                  <p:tgtEl>
+                    <p:sldTgt/>
+                  </p:tgtEl>
+                </p:cond>
+              </p:prevCondLst>
+              <p:nextCondLst>
+                <p:cond evt="onNext" delay="0">
+                  <p:tgtEl>
+                    <p:sldTgt/>
+                  </p:tgtEl>
+                </p:cond>
+              </p:nextCondLst>
+            </p:seq>
+          </p:childTnLst>
+        </p:cTn>
+      </p:par>
+    </p:tnLst>
+  </p:timing>
+</p:sld>
+</file>
+
+<file path=ppt/slides/slide8.xml><?xml version="1.0" encoding="utf-8"?>
+<p:sld xmlns:a="http://schemas.openxmlformats.org/drawingml/2006/main" xmlns:r="http://schemas.openxmlformats.org/officeDocument/2006/relationships" xmlns:p="http://schemas.openxmlformats.org/presentationml/2006/main">
+  <p:cSld>
+    <p:spTree>
+      <p:nvGrpSpPr>
+        <p:cNvPr id="1" name=""/>
+        <p:cNvGrpSpPr/>
+        <p:nvPr/>
+      </p:nvGrpSpPr>
+      <p:grpSpPr>
+        <a:xfrm>
+          <a:off x="0" y="0"/>
+          <a:ext cx="0" cy="0"/>
+          <a:chOff x="0" y="0"/>
+          <a:chExt cx="0" cy="0"/>
+        </a:xfrm>
+      </p:grpSpPr>
+      <p:sp>
+        <p:nvSpPr>
+          <p:cNvPr id="2" name="標題 1"/>
+          <p:cNvSpPr>
+            <a:spLocks noGrp="1"/>
+          </p:cNvSpPr>
+          <p:nvPr>
+            <p:ph type="title"/>
+          </p:nvPr>
+        </p:nvSpPr>
+        <p:spPr/>
+        <p:txBody>
+          <a:bodyPr/>
+          <a:lstStyle/>
+          <a:p>
+            <a:r>
+              <a:rPr kumimoji="1" lang="en-US" altLang="zh-TW" dirty="0" smtClean="0"/>
+              <a:t>Grouping</a:t>
+            </a:r>
+            <a:endParaRPr kumimoji="1" lang="zh-TW" altLang="en-US" dirty="0"/>
+          </a:p>
+        </p:txBody>
+      </p:sp>
+      <p:sp>
+        <p:nvSpPr>
+          <p:cNvPr id="3" name="內容版面配置區 2"/>
+          <p:cNvSpPr>
+            <a:spLocks noGrp="1"/>
+          </p:cNvSpPr>
+          <p:nvPr>
+            <p:ph idx="1"/>
+          </p:nvPr>
+        </p:nvSpPr>
+        <p:spPr/>
+        <p:txBody>
+          <a:bodyPr/>
+          <a:lstStyle/>
+          <a:p>
+            <a:endParaRPr kumimoji="1" lang="zh-TW" altLang="en-US" dirty="0"/>
+          </a:p>
+        </p:txBody>
+      </p:sp>
+    </p:spTree>
+    <p:extLst>
+      <p:ext uri="{BB962C8B-B14F-4D97-AF65-F5344CB8AC3E}">
+        <p14:creationId xmlns:p14="http://schemas.microsoft.com/office/powerpoint/2010/main" val="1393055561"/>
+      </p:ext>
+    </p:extLst>
+  </p:cSld>
+  <p:clrMapOvr>
+    <a:masterClrMapping/>
+  </p:clrMapOvr>
+</p:sld>
+</file>
+
+<file path=ppt/slides/slide9.xml><?xml version="1.0" encoding="utf-8"?>
 <p:sld xmlns:a="http://schemas.openxmlformats.org/drawingml/2006/main" xmlns:r="http://schemas.openxmlformats.org/officeDocument/2006/relationships" xmlns:p="http://schemas.openxmlformats.org/presentationml/2006/main">
   <p:cSld>
     <p:spTree>

</xml_diff>

<commit_message>
added marked2remove=-100, replacing the 0 to remove
</commit_message>
<xml_diff>
--- a/DIP – Final Project.pptx
+++ b/DIP – Final Project.pptx
@@ -8215,8 +8215,46 @@
           <a:lstStyle/>
           <a:p>
             <a:r>
+              <a:rPr kumimoji="1" lang="zh-TW" altLang="en-US" sz="3200" dirty="0" smtClean="0">
+                <a:solidFill>
+                  <a:srgbClr val="FF0000"/>
+                </a:solidFill>
+              </a:rPr>
+              <a:t>人物</a:t>
+            </a:r>
+            <a:r>
               <a:rPr kumimoji="1" lang="zh-TW" altLang="en-US" sz="3200" dirty="0" smtClean="0"/>
-              <a:t>人物為主角的背光補償</a:t>
+              <a:t>為主角的背光</a:t>
+            </a:r>
+            <a:r>
+              <a:rPr kumimoji="1" lang="zh-TW" altLang="en-US" sz="3200" dirty="0" smtClean="0"/>
+              <a:t>補償</a:t>
+            </a:r>
+            <a:endParaRPr kumimoji="1" lang="en-US" altLang="zh-TW" sz="3200" dirty="0" smtClean="0"/>
+          </a:p>
+          <a:p>
+            <a:r>
+              <a:rPr kumimoji="1" lang="zh-TW" altLang="en-US" sz="3200" dirty="0" smtClean="0"/>
+              <a:t>假設</a:t>
+            </a:r>
+            <a:r>
+              <a:rPr kumimoji="1" lang="zh-TW" altLang="en-US" sz="3200" dirty="0" smtClean="0">
+                <a:solidFill>
+                  <a:srgbClr val="FF0000"/>
+                </a:solidFill>
+              </a:rPr>
+              <a:t>光源在後方</a:t>
+            </a:r>
+            <a:endParaRPr kumimoji="1" lang="en-US" altLang="zh-TW" sz="3200" dirty="0" smtClean="0">
+              <a:solidFill>
+                <a:srgbClr val="FF0000"/>
+              </a:solidFill>
+            </a:endParaRPr>
+          </a:p>
+          <a:p>
+            <a:r>
+              <a:rPr kumimoji="1" lang="zh-TW" altLang="en-US" sz="3200" dirty="0" smtClean="0"/>
+              <a:t>假設人物在圖片中央</a:t>
             </a:r>
             <a:endParaRPr kumimoji="1" lang="en-US" altLang="zh-TW" sz="3200" dirty="0" smtClean="0"/>
           </a:p>
@@ -11148,8 +11186,8 @@
           </a:fontRef>
         </p:style>
       </p:cxnSp>
-      <mc:AlternateContent xmlns:mc="http://schemas.openxmlformats.org/markup-compatibility/2006">
-        <mc:Choice xmlns:a14="http://schemas.microsoft.com/office/drawing/2010/main" Requires="a14">
+      <mc:AlternateContent xmlns:mc="http://schemas.openxmlformats.org/markup-compatibility/2006" xmlns:a14="http://schemas.microsoft.com/office/drawing/2010/main">
+        <mc:Choice Requires="a14">
           <p:sp>
             <p:nvSpPr>
               <p:cNvPr id="11" name="文字方塊 10"/>
@@ -11172,6 +11210,7 @@
               </a:bodyPr>
               <a:lstStyle/>
               <a:p>
+                <a:pPr/>
                 <a14:m>
                   <m:oMathPara xmlns:m="http://schemas.openxmlformats.org/officeDocument/2006/math">
                     <m:oMathParaPr>
@@ -11533,7 +11572,7 @@
             </p:txBody>
           </p:sp>
         </mc:Choice>
-        <mc:Fallback>
+        <mc:Fallback xmlns="">
           <p:sp>
             <p:nvSpPr>
               <p:cNvPr id="11" name="文字方塊 10"/>
@@ -11771,8 +11810,8 @@
           </a:prstGeom>
         </p:spPr>
       </p:pic>
-      <mc:AlternateContent xmlns:mc="http://schemas.openxmlformats.org/markup-compatibility/2006">
-        <mc:Choice xmlns:a14="http://schemas.microsoft.com/office/drawing/2010/main" Requires="a14">
+      <mc:AlternateContent xmlns:mc="http://schemas.openxmlformats.org/markup-compatibility/2006" xmlns:a14="http://schemas.microsoft.com/office/drawing/2010/main">
+        <mc:Choice Requires="a14">
           <p:sp>
             <p:nvSpPr>
               <p:cNvPr id="9" name="矩形 8"/>
@@ -11906,7 +11945,7 @@
             </p:txBody>
           </p:sp>
         </mc:Choice>
-        <mc:Fallback>
+        <mc:Fallback xmlns="">
           <p:sp>
             <p:nvSpPr>
               <p:cNvPr id="9" name="矩形 8"/>

</xml_diff>